<commit_message>
New Image Anatomy image, more Ubuntu images
</commit_message>
<xml_diff>
--- a/Presentation/Diagrams.pptx
+++ b/Presentation/Diagrams.pptx
@@ -1,13 +1,14 @@
 
 <file path=ppt/presentation.xml><?xml version="1.0" encoding="utf-8"?>
-<p:presentation xmlns:a="http://schemas.openxmlformats.org/drawingml/2006/main" xmlns:r="http://schemas.openxmlformats.org/officeDocument/2006/relationships" xmlns:mc="http://schemas.openxmlformats.org/markup-compatibility/2006" xmlns:mv="urn:schemas-microsoft-com:mac:vml" xmlns:p="http://schemas.openxmlformats.org/presentationml/2006/main" mc:Ignorable="mv" mc:PreserveAttributes="mv:*" saveSubsetFonts="1" autoCompressPictures="0">
+<p:presentation xmlns:a="http://schemas.openxmlformats.org/drawingml/2006/main" xmlns:r="http://schemas.openxmlformats.org/officeDocument/2006/relationships" xmlns:p="http://schemas.openxmlformats.org/presentationml/2006/main" saveSubsetFonts="1" autoCompressPictures="0">
   <p:sldMasterIdLst>
     <p:sldMasterId id="2147483648" r:id="rId1"/>
   </p:sldMasterIdLst>
   <p:sldIdLst>
     <p:sldId id="257" r:id="rId2"/>
     <p:sldId id="258" r:id="rId3"/>
-    <p:sldId id="259" r:id="rId4"/>
+    <p:sldId id="260" r:id="rId4"/>
+    <p:sldId id="259" r:id="rId5"/>
   </p:sldIdLst>
   <p:sldSz cx="9144000" cy="6858000" type="screen4x3"/>
   <p:notesSz cx="6858000" cy="9144000"/>
@@ -110,7 +111,7 @@
 </file>
 
 <file path=ppt/slideLayouts/slideLayout1.xml><?xml version="1.0" encoding="utf-8"?>
-<p:sldLayout xmlns:a="http://schemas.openxmlformats.org/drawingml/2006/main" xmlns:r="http://schemas.openxmlformats.org/officeDocument/2006/relationships" xmlns:mc="http://schemas.openxmlformats.org/markup-compatibility/2006" xmlns:mv="urn:schemas-microsoft-com:mac:vml" xmlns:p="http://schemas.openxmlformats.org/presentationml/2006/main" mc:Ignorable="mv" mc:PreserveAttributes="mv:*" type="title" preserve="1">
+<p:sldLayout xmlns:a="http://schemas.openxmlformats.org/drawingml/2006/main" xmlns:r="http://schemas.openxmlformats.org/officeDocument/2006/relationships" xmlns:p="http://schemas.openxmlformats.org/presentationml/2006/main" type="title" preserve="1">
   <p:cSld name="Title Slide">
     <p:spTree>
       <p:nvGrpSpPr>
@@ -290,7 +291,7 @@
           <a:p>
             <a:fld id="{DD60D17F-F193-854A-9F7C-934045DD9CD1}" type="datetimeFigureOut">
               <a:rPr lang="en-US" smtClean="0"/>
-              <a:t>8/23/11</a:t>
+              <a:t>9/16/11</a:t>
             </a:fld>
             <a:endParaRPr lang="en-US"/>
           </a:p>
@@ -347,7 +348,7 @@
 </file>
 
 <file path=ppt/slideLayouts/slideLayout10.xml><?xml version="1.0" encoding="utf-8"?>
-<p:sldLayout xmlns:a="http://schemas.openxmlformats.org/drawingml/2006/main" xmlns:r="http://schemas.openxmlformats.org/officeDocument/2006/relationships" xmlns:mc="http://schemas.openxmlformats.org/markup-compatibility/2006" xmlns:mv="urn:schemas-microsoft-com:mac:vml" xmlns:p="http://schemas.openxmlformats.org/presentationml/2006/main" mc:Ignorable="mv" mc:PreserveAttributes="mv:*" type="vertTx" preserve="1">
+<p:sldLayout xmlns:a="http://schemas.openxmlformats.org/drawingml/2006/main" xmlns:r="http://schemas.openxmlformats.org/officeDocument/2006/relationships" xmlns:p="http://schemas.openxmlformats.org/presentationml/2006/main" type="vertTx" preserve="1">
   <p:cSld name="Title and Vertical Text">
     <p:spTree>
       <p:nvGrpSpPr>
@@ -455,7 +456,7 @@
           <a:p>
             <a:fld id="{DD60D17F-F193-854A-9F7C-934045DD9CD1}" type="datetimeFigureOut">
               <a:rPr lang="en-US" smtClean="0"/>
-              <a:t>8/23/11</a:t>
+              <a:t>9/16/11</a:t>
             </a:fld>
             <a:endParaRPr lang="en-US"/>
           </a:p>
@@ -512,7 +513,7 @@
 </file>
 
 <file path=ppt/slideLayouts/slideLayout11.xml><?xml version="1.0" encoding="utf-8"?>
-<p:sldLayout xmlns:a="http://schemas.openxmlformats.org/drawingml/2006/main" xmlns:r="http://schemas.openxmlformats.org/officeDocument/2006/relationships" xmlns:mc="http://schemas.openxmlformats.org/markup-compatibility/2006" xmlns:mv="urn:schemas-microsoft-com:mac:vml" xmlns:p="http://schemas.openxmlformats.org/presentationml/2006/main" mc:Ignorable="mv" mc:PreserveAttributes="mv:*" type="vertTitleAndTx" preserve="1">
+<p:sldLayout xmlns:a="http://schemas.openxmlformats.org/drawingml/2006/main" xmlns:r="http://schemas.openxmlformats.org/officeDocument/2006/relationships" xmlns:p="http://schemas.openxmlformats.org/presentationml/2006/main" type="vertTitleAndTx" preserve="1">
   <p:cSld name="Vertical Title and Text">
     <p:spTree>
       <p:nvGrpSpPr>
@@ -630,7 +631,7 @@
           <a:p>
             <a:fld id="{DD60D17F-F193-854A-9F7C-934045DD9CD1}" type="datetimeFigureOut">
               <a:rPr lang="en-US" smtClean="0"/>
-              <a:t>8/23/11</a:t>
+              <a:t>9/16/11</a:t>
             </a:fld>
             <a:endParaRPr lang="en-US"/>
           </a:p>
@@ -687,7 +688,7 @@
 </file>
 
 <file path=ppt/slideLayouts/slideLayout2.xml><?xml version="1.0" encoding="utf-8"?>
-<p:sldLayout xmlns:a="http://schemas.openxmlformats.org/drawingml/2006/main" xmlns:r="http://schemas.openxmlformats.org/officeDocument/2006/relationships" xmlns:mc="http://schemas.openxmlformats.org/markup-compatibility/2006" xmlns:mv="urn:schemas-microsoft-com:mac:vml" xmlns:p="http://schemas.openxmlformats.org/presentationml/2006/main" mc:Ignorable="mv" mc:PreserveAttributes="mv:*" type="obj" preserve="1">
+<p:sldLayout xmlns:a="http://schemas.openxmlformats.org/drawingml/2006/main" xmlns:r="http://schemas.openxmlformats.org/officeDocument/2006/relationships" xmlns:p="http://schemas.openxmlformats.org/presentationml/2006/main" type="obj" preserve="1">
   <p:cSld name="Title and Content">
     <p:spTree>
       <p:nvGrpSpPr>
@@ -795,7 +796,7 @@
           <a:p>
             <a:fld id="{DD60D17F-F193-854A-9F7C-934045DD9CD1}" type="datetimeFigureOut">
               <a:rPr lang="en-US" smtClean="0"/>
-              <a:t>8/23/11</a:t>
+              <a:t>9/16/11</a:t>
             </a:fld>
             <a:endParaRPr lang="en-US"/>
           </a:p>
@@ -852,7 +853,7 @@
 </file>
 
 <file path=ppt/slideLayouts/slideLayout3.xml><?xml version="1.0" encoding="utf-8"?>
-<p:sldLayout xmlns:a="http://schemas.openxmlformats.org/drawingml/2006/main" xmlns:r="http://schemas.openxmlformats.org/officeDocument/2006/relationships" xmlns:mc="http://schemas.openxmlformats.org/markup-compatibility/2006" xmlns:mv="urn:schemas-microsoft-com:mac:vml" xmlns:p="http://schemas.openxmlformats.org/presentationml/2006/main" mc:Ignorable="mv" mc:PreserveAttributes="mv:*" type="secHead" preserve="1">
+<p:sldLayout xmlns:a="http://schemas.openxmlformats.org/drawingml/2006/main" xmlns:r="http://schemas.openxmlformats.org/officeDocument/2006/relationships" xmlns:p="http://schemas.openxmlformats.org/presentationml/2006/main" type="secHead" preserve="1">
   <p:cSld name="Section Header">
     <p:spTree>
       <p:nvGrpSpPr>
@@ -1036,7 +1037,7 @@
           <a:p>
             <a:fld id="{DD60D17F-F193-854A-9F7C-934045DD9CD1}" type="datetimeFigureOut">
               <a:rPr lang="en-US" smtClean="0"/>
-              <a:t>8/23/11</a:t>
+              <a:t>9/16/11</a:t>
             </a:fld>
             <a:endParaRPr lang="en-US"/>
           </a:p>
@@ -1093,7 +1094,7 @@
 </file>
 
 <file path=ppt/slideLayouts/slideLayout4.xml><?xml version="1.0" encoding="utf-8"?>
-<p:sldLayout xmlns:a="http://schemas.openxmlformats.org/drawingml/2006/main" xmlns:r="http://schemas.openxmlformats.org/officeDocument/2006/relationships" xmlns:mc="http://schemas.openxmlformats.org/markup-compatibility/2006" xmlns:mv="urn:schemas-microsoft-com:mac:vml" xmlns:p="http://schemas.openxmlformats.org/presentationml/2006/main" mc:Ignorable="mv" mc:PreserveAttributes="mv:*" type="twoObj" preserve="1">
+<p:sldLayout xmlns:a="http://schemas.openxmlformats.org/drawingml/2006/main" xmlns:r="http://schemas.openxmlformats.org/officeDocument/2006/relationships" xmlns:p="http://schemas.openxmlformats.org/presentationml/2006/main" type="twoObj" preserve="1">
   <p:cSld name="Two Content">
     <p:spTree>
       <p:nvGrpSpPr>
@@ -1319,7 +1320,7 @@
           <a:p>
             <a:fld id="{DD60D17F-F193-854A-9F7C-934045DD9CD1}" type="datetimeFigureOut">
               <a:rPr lang="en-US" smtClean="0"/>
-              <a:t>8/23/11</a:t>
+              <a:t>9/16/11</a:t>
             </a:fld>
             <a:endParaRPr lang="en-US"/>
           </a:p>
@@ -1376,7 +1377,7 @@
 </file>
 
 <file path=ppt/slideLayouts/slideLayout5.xml><?xml version="1.0" encoding="utf-8"?>
-<p:sldLayout xmlns:a="http://schemas.openxmlformats.org/drawingml/2006/main" xmlns:r="http://schemas.openxmlformats.org/officeDocument/2006/relationships" xmlns:mc="http://schemas.openxmlformats.org/markup-compatibility/2006" xmlns:mv="urn:schemas-microsoft-com:mac:vml" xmlns:p="http://schemas.openxmlformats.org/presentationml/2006/main" mc:Ignorable="mv" mc:PreserveAttributes="mv:*" type="twoTxTwoObj" preserve="1">
+<p:sldLayout xmlns:a="http://schemas.openxmlformats.org/drawingml/2006/main" xmlns:r="http://schemas.openxmlformats.org/officeDocument/2006/relationships" xmlns:p="http://schemas.openxmlformats.org/presentationml/2006/main" type="twoTxTwoObj" preserve="1">
   <p:cSld name="Comparison">
     <p:spTree>
       <p:nvGrpSpPr>
@@ -1736,7 +1737,7 @@
           <a:p>
             <a:fld id="{DD60D17F-F193-854A-9F7C-934045DD9CD1}" type="datetimeFigureOut">
               <a:rPr lang="en-US" smtClean="0"/>
-              <a:t>8/23/11</a:t>
+              <a:t>9/16/11</a:t>
             </a:fld>
             <a:endParaRPr lang="en-US"/>
           </a:p>
@@ -1793,7 +1794,7 @@
 </file>
 
 <file path=ppt/slideLayouts/slideLayout6.xml><?xml version="1.0" encoding="utf-8"?>
-<p:sldLayout xmlns:a="http://schemas.openxmlformats.org/drawingml/2006/main" xmlns:r="http://schemas.openxmlformats.org/officeDocument/2006/relationships" xmlns:mc="http://schemas.openxmlformats.org/markup-compatibility/2006" xmlns:mv="urn:schemas-microsoft-com:mac:vml" xmlns:p="http://schemas.openxmlformats.org/presentationml/2006/main" mc:Ignorable="mv" mc:PreserveAttributes="mv:*" type="titleOnly" preserve="1">
+<p:sldLayout xmlns:a="http://schemas.openxmlformats.org/drawingml/2006/main" xmlns:r="http://schemas.openxmlformats.org/officeDocument/2006/relationships" xmlns:p="http://schemas.openxmlformats.org/presentationml/2006/main" type="titleOnly" preserve="1">
   <p:cSld name="Title Only">
     <p:spTree>
       <p:nvGrpSpPr>
@@ -1849,7 +1850,7 @@
           <a:p>
             <a:fld id="{DD60D17F-F193-854A-9F7C-934045DD9CD1}" type="datetimeFigureOut">
               <a:rPr lang="en-US" smtClean="0"/>
-              <a:t>8/23/11</a:t>
+              <a:t>9/16/11</a:t>
             </a:fld>
             <a:endParaRPr lang="en-US"/>
           </a:p>
@@ -1906,7 +1907,7 @@
 </file>
 
 <file path=ppt/slideLayouts/slideLayout7.xml><?xml version="1.0" encoding="utf-8"?>
-<p:sldLayout xmlns:a="http://schemas.openxmlformats.org/drawingml/2006/main" xmlns:r="http://schemas.openxmlformats.org/officeDocument/2006/relationships" xmlns:mc="http://schemas.openxmlformats.org/markup-compatibility/2006" xmlns:mv="urn:schemas-microsoft-com:mac:vml" xmlns:p="http://schemas.openxmlformats.org/presentationml/2006/main" mc:Ignorable="mv" mc:PreserveAttributes="mv:*" type="blank" preserve="1">
+<p:sldLayout xmlns:a="http://schemas.openxmlformats.org/drawingml/2006/main" xmlns:r="http://schemas.openxmlformats.org/officeDocument/2006/relationships" xmlns:p="http://schemas.openxmlformats.org/presentationml/2006/main" type="blank" preserve="1">
   <p:cSld name="Blank">
     <p:spTree>
       <p:nvGrpSpPr>
@@ -1939,7 +1940,7 @@
           <a:p>
             <a:fld id="{DD60D17F-F193-854A-9F7C-934045DD9CD1}" type="datetimeFigureOut">
               <a:rPr lang="en-US" smtClean="0"/>
-              <a:t>8/23/11</a:t>
+              <a:t>9/16/11</a:t>
             </a:fld>
             <a:endParaRPr lang="en-US"/>
           </a:p>
@@ -1996,7 +1997,7 @@
 </file>
 
 <file path=ppt/slideLayouts/slideLayout8.xml><?xml version="1.0" encoding="utf-8"?>
-<p:sldLayout xmlns:a="http://schemas.openxmlformats.org/drawingml/2006/main" xmlns:r="http://schemas.openxmlformats.org/officeDocument/2006/relationships" xmlns:mc="http://schemas.openxmlformats.org/markup-compatibility/2006" xmlns:mv="urn:schemas-microsoft-com:mac:vml" xmlns:p="http://schemas.openxmlformats.org/presentationml/2006/main" mc:Ignorable="mv" mc:PreserveAttributes="mv:*" type="objTx" preserve="1">
+<p:sldLayout xmlns:a="http://schemas.openxmlformats.org/drawingml/2006/main" xmlns:r="http://schemas.openxmlformats.org/officeDocument/2006/relationships" xmlns:p="http://schemas.openxmlformats.org/presentationml/2006/main" type="objTx" preserve="1">
   <p:cSld name="Content with Caption">
     <p:spTree>
       <p:nvGrpSpPr>
@@ -2211,7 +2212,7 @@
           <a:p>
             <a:fld id="{DD60D17F-F193-854A-9F7C-934045DD9CD1}" type="datetimeFigureOut">
               <a:rPr lang="en-US" smtClean="0"/>
-              <a:t>8/23/11</a:t>
+              <a:t>9/16/11</a:t>
             </a:fld>
             <a:endParaRPr lang="en-US"/>
           </a:p>
@@ -2268,7 +2269,7 @@
 </file>
 
 <file path=ppt/slideLayouts/slideLayout9.xml><?xml version="1.0" encoding="utf-8"?>
-<p:sldLayout xmlns:a="http://schemas.openxmlformats.org/drawingml/2006/main" xmlns:r="http://schemas.openxmlformats.org/officeDocument/2006/relationships" xmlns:mc="http://schemas.openxmlformats.org/markup-compatibility/2006" xmlns:mv="urn:schemas-microsoft-com:mac:vml" xmlns:p="http://schemas.openxmlformats.org/presentationml/2006/main" mc:Ignorable="mv" mc:PreserveAttributes="mv:*" type="picTx" preserve="1">
+<p:sldLayout xmlns:a="http://schemas.openxmlformats.org/drawingml/2006/main" xmlns:r="http://schemas.openxmlformats.org/officeDocument/2006/relationships" xmlns:p="http://schemas.openxmlformats.org/presentationml/2006/main" type="picTx" preserve="1">
   <p:cSld name="Picture with Caption">
     <p:spTree>
       <p:nvGrpSpPr>
@@ -2459,7 +2460,7 @@
           <a:p>
             <a:fld id="{DD60D17F-F193-854A-9F7C-934045DD9CD1}" type="datetimeFigureOut">
               <a:rPr lang="en-US" smtClean="0"/>
-              <a:t>8/23/11</a:t>
+              <a:t>9/16/11</a:t>
             </a:fld>
             <a:endParaRPr lang="en-US"/>
           </a:p>
@@ -2516,7 +2517,7 @@
 </file>
 
 <file path=ppt/slideMasters/slideMaster1.xml><?xml version="1.0" encoding="utf-8"?>
-<p:sldMaster xmlns:a="http://schemas.openxmlformats.org/drawingml/2006/main" xmlns:r="http://schemas.openxmlformats.org/officeDocument/2006/relationships" xmlns:mc="http://schemas.openxmlformats.org/markup-compatibility/2006" xmlns:mv="urn:schemas-microsoft-com:mac:vml" xmlns:p="http://schemas.openxmlformats.org/presentationml/2006/main" mc:Ignorable="mv" mc:PreserveAttributes="mv:*">
+<p:sldMaster xmlns:a="http://schemas.openxmlformats.org/drawingml/2006/main" xmlns:r="http://schemas.openxmlformats.org/officeDocument/2006/relationships" xmlns:p="http://schemas.openxmlformats.org/presentationml/2006/main">
   <p:cSld>
     <p:bg>
       <p:bgRef idx="1001">
@@ -2667,7 +2668,7 @@
           <a:p>
             <a:fld id="{DD60D17F-F193-854A-9F7C-934045DD9CD1}" type="datetimeFigureOut">
               <a:rPr lang="en-US" smtClean="0"/>
-              <a:t>8/23/11</a:t>
+              <a:t>9/16/11</a:t>
             </a:fld>
             <a:endParaRPr lang="en-US"/>
           </a:p>
@@ -3021,7 +3022,7 @@
 </file>
 
 <file path=ppt/slides/slide1.xml><?xml version="1.0" encoding="utf-8"?>
-<p:sld xmlns:a="http://schemas.openxmlformats.org/drawingml/2006/main" xmlns:r="http://schemas.openxmlformats.org/officeDocument/2006/relationships" xmlns:mc="http://schemas.openxmlformats.org/markup-compatibility/2006" xmlns:mv="urn:schemas-microsoft-com:mac:vml" xmlns:p="http://schemas.openxmlformats.org/presentationml/2006/main" mc:Ignorable="mv" mc:PreserveAttributes="mv:*">
+<p:sld xmlns:a="http://schemas.openxmlformats.org/drawingml/2006/main" xmlns:r="http://schemas.openxmlformats.org/officeDocument/2006/relationships" xmlns:p="http://schemas.openxmlformats.org/presentationml/2006/main">
   <p:cSld>
     <p:spTree>
       <p:nvGrpSpPr>
@@ -3598,7 +3599,7 @@
 </file>
 
 <file path=ppt/slides/slide2.xml><?xml version="1.0" encoding="utf-8"?>
-<p:sld xmlns:a="http://schemas.openxmlformats.org/drawingml/2006/main" xmlns:r="http://schemas.openxmlformats.org/officeDocument/2006/relationships" xmlns:mc="http://schemas.openxmlformats.org/markup-compatibility/2006" xmlns:mv="urn:schemas-microsoft-com:mac:vml" xmlns:p="http://schemas.openxmlformats.org/presentationml/2006/main" mc:Ignorable="mv" mc:PreserveAttributes="mv:*">
+<p:sld xmlns:a="http://schemas.openxmlformats.org/drawingml/2006/main" xmlns:r="http://schemas.openxmlformats.org/officeDocument/2006/relationships" xmlns:p="http://schemas.openxmlformats.org/presentationml/2006/main">
   <p:cSld>
     <p:spTree>
       <p:nvGrpSpPr>
@@ -3856,7 +3857,6 @@
               <a:rPr lang="en-US" sz="3600" dirty="0" smtClean="0"/>
               <a:t>output = Filter.Execute ( input )</a:t>
             </a:r>
-            <a:endParaRPr lang="en-US" sz="3600" dirty="0" smtClean="0"/>
           </a:p>
         </p:txBody>
       </p:sp>
@@ -4126,7 +4126,6 @@
               <a:rPr lang="en-US" sz="19900" dirty="0"/>
               <a:t>}</a:t>
             </a:r>
-            <a:endParaRPr lang="en-US" sz="19900" dirty="0"/>
           </a:p>
         </p:txBody>
       </p:sp>
@@ -4292,7 +4291,6 @@
               <a:rPr lang="en-US" sz="3600" dirty="0" smtClean="0"/>
               <a:t>input</a:t>
             </a:r>
-            <a:endParaRPr lang="en-US" sz="3600" dirty="0" smtClean="0"/>
           </a:p>
         </p:txBody>
       </p:sp>
@@ -4323,7 +4321,6 @@
               <a:rPr lang="en-US" sz="3600" dirty="0" smtClean="0"/>
               <a:t>output</a:t>
             </a:r>
-            <a:endParaRPr lang="en-US" sz="3600" dirty="0" smtClean="0"/>
           </a:p>
         </p:txBody>
       </p:sp>
@@ -4336,7 +4333,7 @@
 </file>
 
 <file path=ppt/slides/slide3.xml><?xml version="1.0" encoding="utf-8"?>
-<p:sld xmlns:a="http://schemas.openxmlformats.org/drawingml/2006/main" xmlns:r="http://schemas.openxmlformats.org/officeDocument/2006/relationships" xmlns:mc="http://schemas.openxmlformats.org/markup-compatibility/2006" xmlns:mv="urn:schemas-microsoft-com:mac:vml" xmlns:p="http://schemas.openxmlformats.org/presentationml/2006/main" mc:Ignorable="mv" mc:PreserveAttributes="mv:*">
+<p:sld xmlns:a="http://schemas.openxmlformats.org/drawingml/2006/main" xmlns:r="http://schemas.openxmlformats.org/officeDocument/2006/relationships" xmlns:p="http://schemas.openxmlformats.org/presentationml/2006/main">
   <p:cSld>
     <p:spTree>
       <p:nvGrpSpPr>
@@ -4354,6 +4351,456 @@
       </p:grpSpPr>
       <p:sp>
         <p:nvSpPr>
+          <p:cNvPr id="4" name="Rounded Rectangle 3"/>
+          <p:cNvSpPr/>
+          <p:nvPr/>
+        </p:nvSpPr>
+        <p:spPr>
+          <a:xfrm>
+            <a:off x="2567869" y="228413"/>
+            <a:ext cx="3177391" cy="5256119"/>
+          </a:xfrm>
+          <a:prstGeom prst="roundRect">
+            <a:avLst/>
+          </a:prstGeom>
+        </p:spPr>
+        <p:style>
+          <a:lnRef idx="1">
+            <a:schemeClr val="accent1"/>
+          </a:lnRef>
+          <a:fillRef idx="3">
+            <a:schemeClr val="accent1"/>
+          </a:fillRef>
+          <a:effectRef idx="2">
+            <a:schemeClr val="accent1"/>
+          </a:effectRef>
+          <a:fontRef idx="minor">
+            <a:schemeClr val="lt1"/>
+          </a:fontRef>
+        </p:style>
+        <p:txBody>
+          <a:bodyPr rtlCol="0" anchor="t"/>
+          <a:lstStyle/>
+          <a:p>
+            <a:pPr algn="ctr"/>
+            <a:r>
+              <a:rPr lang="en-US" dirty="0" smtClean="0"/>
+              <a:t>SimpleITK</a:t>
+            </a:r>
+          </a:p>
+          <a:p>
+            <a:pPr algn="ctr"/>
+            <a:r>
+              <a:rPr lang="en-US" dirty="0" smtClean="0"/>
+              <a:t>Image</a:t>
+            </a:r>
+            <a:endParaRPr lang="en-US" dirty="0"/>
+          </a:p>
+        </p:txBody>
+      </p:sp>
+      <p:sp>
+        <p:nvSpPr>
+          <p:cNvPr id="7" name="Rectangle 6"/>
+          <p:cNvSpPr/>
+          <p:nvPr/>
+        </p:nvSpPr>
+        <p:spPr>
+          <a:xfrm>
+            <a:off x="2789115" y="1087976"/>
+            <a:ext cx="2739308" cy="4060388"/>
+          </a:xfrm>
+          <a:prstGeom prst="rect">
+            <a:avLst/>
+          </a:prstGeom>
+        </p:spPr>
+        <p:style>
+          <a:lnRef idx="3">
+            <a:schemeClr val="lt1"/>
+          </a:lnRef>
+          <a:fillRef idx="1">
+            <a:schemeClr val="accent3"/>
+          </a:fillRef>
+          <a:effectRef idx="1">
+            <a:schemeClr val="accent3"/>
+          </a:effectRef>
+          <a:fontRef idx="minor">
+            <a:schemeClr val="lt1"/>
+          </a:fontRef>
+        </p:style>
+        <p:txBody>
+          <a:bodyPr rtlCol="0" anchor="t"/>
+          <a:lstStyle/>
+          <a:p>
+            <a:pPr algn="ctr"/>
+            <a:r>
+              <a:rPr lang="en-US" dirty="0" smtClean="0"/>
+              <a:t>ITK</a:t>
+            </a:r>
+          </a:p>
+          <a:p>
+            <a:pPr algn="ctr"/>
+            <a:r>
+              <a:rPr lang="en-US" dirty="0" smtClean="0"/>
+              <a:t>Image</a:t>
+            </a:r>
+            <a:endParaRPr lang="en-US" dirty="0"/>
+          </a:p>
+        </p:txBody>
+      </p:sp>
+      <p:grpSp>
+        <p:nvGrpSpPr>
+          <p:cNvPr id="11" name="Group 10"/>
+          <p:cNvGrpSpPr/>
+          <p:nvPr/>
+        </p:nvGrpSpPr>
+        <p:grpSpPr>
+          <a:xfrm>
+            <a:off x="2939957" y="1802747"/>
+            <a:ext cx="2442927" cy="3130285"/>
+            <a:chOff x="2939957" y="2828171"/>
+            <a:chExt cx="2442927" cy="3130285"/>
+          </a:xfrm>
+        </p:grpSpPr>
+        <p:sp>
+          <p:nvSpPr>
+            <p:cNvPr id="8" name="Rectangle 7"/>
+            <p:cNvSpPr/>
+            <p:nvPr/>
+          </p:nvSpPr>
+          <p:spPr>
+            <a:xfrm>
+              <a:off x="2939957" y="2828171"/>
+              <a:ext cx="2442927" cy="416885"/>
+            </a:xfrm>
+            <a:prstGeom prst="rect">
+              <a:avLst/>
+            </a:prstGeom>
+          </p:spPr>
+          <p:style>
+            <a:lnRef idx="1">
+              <a:schemeClr val="accent2"/>
+            </a:lnRef>
+            <a:fillRef idx="3">
+              <a:schemeClr val="accent2"/>
+            </a:fillRef>
+            <a:effectRef idx="2">
+              <a:schemeClr val="accent2"/>
+            </a:effectRef>
+            <a:fontRef idx="minor">
+              <a:schemeClr val="lt1"/>
+            </a:fontRef>
+          </p:style>
+          <p:txBody>
+            <a:bodyPr rtlCol="0" anchor="ctr"/>
+            <a:lstStyle/>
+            <a:p>
+              <a:pPr algn="ctr"/>
+              <a:r>
+                <a:rPr lang="en-US" dirty="0" err="1" smtClean="0"/>
+                <a:t>itk</a:t>
+              </a:r>
+              <a:r>
+                <a:rPr lang="en-US" dirty="0" smtClean="0"/>
+                <a:t>::Image&lt;</a:t>
+              </a:r>
+              <a:r>
+                <a:rPr lang="en-US" dirty="0" smtClean="0"/>
+                <a:t>uint_8,2&gt;</a:t>
+              </a:r>
+              <a:endParaRPr lang="en-US" dirty="0"/>
+            </a:p>
+          </p:txBody>
+        </p:sp>
+        <p:sp>
+          <p:nvSpPr>
+            <p:cNvPr id="33" name="Rectangle 32"/>
+            <p:cNvSpPr/>
+            <p:nvPr/>
+          </p:nvSpPr>
+          <p:spPr>
+            <a:xfrm>
+              <a:off x="2939957" y="3367890"/>
+              <a:ext cx="2442927" cy="416885"/>
+            </a:xfrm>
+            <a:prstGeom prst="rect">
+              <a:avLst/>
+            </a:prstGeom>
+          </p:spPr>
+          <p:style>
+            <a:lnRef idx="1">
+              <a:schemeClr val="accent2"/>
+            </a:lnRef>
+            <a:fillRef idx="3">
+              <a:schemeClr val="accent2"/>
+            </a:fillRef>
+            <a:effectRef idx="2">
+              <a:schemeClr val="accent2"/>
+            </a:effectRef>
+            <a:fontRef idx="minor">
+              <a:schemeClr val="lt1"/>
+            </a:fontRef>
+          </p:style>
+          <p:txBody>
+            <a:bodyPr rtlCol="0" anchor="ctr"/>
+            <a:lstStyle/>
+            <a:p>
+              <a:pPr algn="ctr"/>
+              <a:r>
+                <a:rPr lang="en-US" dirty="0" err="1"/>
+                <a:t>itk</a:t>
+              </a:r>
+              <a:r>
+                <a:rPr lang="en-US" dirty="0"/>
+                <a:t>::Image&lt;</a:t>
+              </a:r>
+              <a:r>
+                <a:rPr lang="en-US" dirty="0" smtClean="0"/>
+                <a:t>uint_16,2&gt;</a:t>
+              </a:r>
+              <a:endParaRPr lang="en-US" dirty="0"/>
+            </a:p>
+          </p:txBody>
+        </p:sp>
+        <p:sp>
+          <p:nvSpPr>
+            <p:cNvPr id="34" name="Rectangle 33"/>
+            <p:cNvSpPr/>
+            <p:nvPr/>
+          </p:nvSpPr>
+          <p:spPr>
+            <a:xfrm>
+              <a:off x="2939957" y="3907609"/>
+              <a:ext cx="2442927" cy="416885"/>
+            </a:xfrm>
+            <a:prstGeom prst="rect">
+              <a:avLst/>
+            </a:prstGeom>
+          </p:spPr>
+          <p:style>
+            <a:lnRef idx="1">
+              <a:schemeClr val="accent2"/>
+            </a:lnRef>
+            <a:fillRef idx="3">
+              <a:schemeClr val="accent2"/>
+            </a:fillRef>
+            <a:effectRef idx="2">
+              <a:schemeClr val="accent2"/>
+            </a:effectRef>
+            <a:fontRef idx="minor">
+              <a:schemeClr val="lt1"/>
+            </a:fontRef>
+          </p:style>
+          <p:txBody>
+            <a:bodyPr rtlCol="0" anchor="ctr"/>
+            <a:lstStyle/>
+            <a:p>
+              <a:pPr algn="ctr"/>
+              <a:r>
+                <a:rPr lang="en-US" dirty="0" err="1"/>
+                <a:t>itk</a:t>
+              </a:r>
+              <a:r>
+                <a:rPr lang="en-US" dirty="0"/>
+                <a:t>::Image&lt;</a:t>
+              </a:r>
+              <a:r>
+                <a:rPr lang="en-US" dirty="0" smtClean="0"/>
+                <a:t>float,2&gt;</a:t>
+              </a:r>
+              <a:endParaRPr lang="en-US" dirty="0"/>
+            </a:p>
+          </p:txBody>
+        </p:sp>
+        <p:sp>
+          <p:nvSpPr>
+            <p:cNvPr id="35" name="Rectangle 34"/>
+            <p:cNvSpPr/>
+            <p:nvPr/>
+          </p:nvSpPr>
+          <p:spPr>
+            <a:xfrm>
+              <a:off x="2939957" y="4447328"/>
+              <a:ext cx="2442927" cy="416885"/>
+            </a:xfrm>
+            <a:prstGeom prst="rect">
+              <a:avLst/>
+            </a:prstGeom>
+          </p:spPr>
+          <p:style>
+            <a:lnRef idx="1">
+              <a:schemeClr val="accent2"/>
+            </a:lnRef>
+            <a:fillRef idx="3">
+              <a:schemeClr val="accent2"/>
+            </a:fillRef>
+            <a:effectRef idx="2">
+              <a:schemeClr val="accent2"/>
+            </a:effectRef>
+            <a:fontRef idx="minor">
+              <a:schemeClr val="lt1"/>
+            </a:fontRef>
+          </p:style>
+          <p:txBody>
+            <a:bodyPr rtlCol="0" anchor="ctr"/>
+            <a:lstStyle/>
+            <a:p>
+              <a:pPr algn="ctr"/>
+              <a:r>
+                <a:rPr lang="en-US" dirty="0" err="1"/>
+                <a:t>itk</a:t>
+              </a:r>
+              <a:r>
+                <a:rPr lang="en-US" dirty="0"/>
+                <a:t>::Image&lt;</a:t>
+              </a:r>
+              <a:r>
+                <a:rPr lang="en-US" dirty="0" smtClean="0"/>
+                <a:t>uint_8,3&gt;</a:t>
+              </a:r>
+              <a:endParaRPr lang="en-US" dirty="0"/>
+            </a:p>
+          </p:txBody>
+        </p:sp>
+        <p:sp>
+          <p:nvSpPr>
+            <p:cNvPr id="36" name="Rectangle 35"/>
+            <p:cNvSpPr/>
+            <p:nvPr/>
+          </p:nvSpPr>
+          <p:spPr>
+            <a:xfrm>
+              <a:off x="2939957" y="4987045"/>
+              <a:ext cx="2442927" cy="416885"/>
+            </a:xfrm>
+            <a:prstGeom prst="rect">
+              <a:avLst/>
+            </a:prstGeom>
+          </p:spPr>
+          <p:style>
+            <a:lnRef idx="1">
+              <a:schemeClr val="accent2"/>
+            </a:lnRef>
+            <a:fillRef idx="3">
+              <a:schemeClr val="accent2"/>
+            </a:fillRef>
+            <a:effectRef idx="2">
+              <a:schemeClr val="accent2"/>
+            </a:effectRef>
+            <a:fontRef idx="minor">
+              <a:schemeClr val="lt1"/>
+            </a:fontRef>
+          </p:style>
+          <p:txBody>
+            <a:bodyPr rtlCol="0" anchor="ctr"/>
+            <a:lstStyle/>
+            <a:p>
+              <a:pPr algn="ctr"/>
+              <a:r>
+                <a:rPr lang="en-US" dirty="0" err="1"/>
+                <a:t>itk</a:t>
+              </a:r>
+              <a:r>
+                <a:rPr lang="en-US" dirty="0"/>
+                <a:t>::Image&lt;</a:t>
+              </a:r>
+              <a:r>
+                <a:rPr lang="en-US" dirty="0" smtClean="0"/>
+                <a:t>uint_16,3&gt;</a:t>
+              </a:r>
+              <a:endParaRPr lang="en-US" dirty="0"/>
+            </a:p>
+          </p:txBody>
+        </p:sp>
+        <p:sp>
+          <p:nvSpPr>
+            <p:cNvPr id="38" name="Rectangle 37"/>
+            <p:cNvSpPr/>
+            <p:nvPr/>
+          </p:nvSpPr>
+          <p:spPr>
+            <a:xfrm>
+              <a:off x="2939957" y="5541571"/>
+              <a:ext cx="2442927" cy="416885"/>
+            </a:xfrm>
+            <a:prstGeom prst="rect">
+              <a:avLst/>
+            </a:prstGeom>
+          </p:spPr>
+          <p:style>
+            <a:lnRef idx="1">
+              <a:schemeClr val="accent2"/>
+            </a:lnRef>
+            <a:fillRef idx="3">
+              <a:schemeClr val="accent2"/>
+            </a:fillRef>
+            <a:effectRef idx="2">
+              <a:schemeClr val="accent2"/>
+            </a:effectRef>
+            <a:fontRef idx="minor">
+              <a:schemeClr val="lt1"/>
+            </a:fontRef>
+          </p:style>
+          <p:txBody>
+            <a:bodyPr rtlCol="0" anchor="ctr"/>
+            <a:lstStyle/>
+            <a:p>
+              <a:pPr algn="ctr"/>
+              <a:r>
+                <a:rPr lang="en-US" dirty="0" err="1"/>
+                <a:t>itk</a:t>
+              </a:r>
+              <a:r>
+                <a:rPr lang="en-US" dirty="0"/>
+                <a:t>::Image&lt;</a:t>
+              </a:r>
+              <a:r>
+                <a:rPr lang="en-US" dirty="0" smtClean="0"/>
+                <a:t>float,3&gt;</a:t>
+              </a:r>
+              <a:endParaRPr lang="en-US" dirty="0"/>
+            </a:p>
+          </p:txBody>
+        </p:sp>
+      </p:grpSp>
+    </p:spTree>
+    <p:extLst>
+      <p:ext uri="{BB962C8B-B14F-4D97-AF65-F5344CB8AC3E}">
+        <p14:creationId xmlns:p14="http://schemas.microsoft.com/office/powerpoint/2010/main" val="2957283477"/>
+      </p:ext>
+    </p:extLst>
+  </p:cSld>
+  <p:clrMapOvr>
+    <a:masterClrMapping/>
+  </p:clrMapOvr>
+  <p:timing>
+    <p:tnLst>
+      <p:par>
+        <p:cTn xmlns:p14="http://schemas.microsoft.com/office/powerpoint/2010/main" id="1" dur="indefinite" restart="never" nodeType="tmRoot"/>
+      </p:par>
+    </p:tnLst>
+  </p:timing>
+</p:sld>
+</file>
+
+<file path=ppt/slides/slide4.xml><?xml version="1.0" encoding="utf-8"?>
+<p:sld xmlns:a="http://schemas.openxmlformats.org/drawingml/2006/main" xmlns:r="http://schemas.openxmlformats.org/officeDocument/2006/relationships" xmlns:p="http://schemas.openxmlformats.org/presentationml/2006/main">
+  <p:cSld>
+    <p:spTree>
+      <p:nvGrpSpPr>
+        <p:cNvPr id="1" name=""/>
+        <p:cNvGrpSpPr/>
+        <p:nvPr/>
+      </p:nvGrpSpPr>
+      <p:grpSpPr>
+        <a:xfrm>
+          <a:off x="0" y="0"/>
+          <a:ext cx="0" cy="0"/>
+          <a:chOff x="0" y="0"/>
+          <a:chExt cx="0" cy="0"/>
+        </a:xfrm>
+      </p:grpSpPr>
+      <p:sp>
+        <p:nvSpPr>
           <p:cNvPr id="2" name="Multidocument 1"/>
           <p:cNvSpPr/>
           <p:nvPr/>
@@ -4599,7 +5046,7 @@
   <p:timing>
     <p:tnLst>
       <p:par>
-        <p:cTn id="1" dur="indefinite" restart="never" nodeType="tmRoot"/>
+        <p:cTn xmlns:p14="http://schemas.microsoft.com/office/powerpoint/2010/main" id="1" dur="indefinite" restart="never" nodeType="tmRoot"/>
       </p:par>
     </p:tnLst>
   </p:timing>

</xml_diff>